<commit_message>
Byzantine client -> Byzantine attacker
</commit_message>
<xml_diff>
--- a/Manuscript_TIFS/figures/Figure_System.pptx
+++ b/Manuscript_TIFS/figures/Figure_System.pptx
@@ -241,7 +241,7 @@
           <a:p>
             <a:fld id="{D997B5FA-0921-464F-AAE1-844C04324D75}" type="datetimeFigureOut">
               <a:rPr lang="zh-CN" altLang="en-US" smtClean="0"/>
-              <a:t>2022-02-24</a:t>
+              <a:t>2022-02-25</a:t>
             </a:fld>
             <a:endParaRPr lang="zh-CN" altLang="en-US"/>
           </a:p>
@@ -404,7 +404,7 @@
           <a:p>
             <a:fld id="{D997B5FA-0921-464F-AAE1-844C04324D75}" type="datetimeFigureOut">
               <a:rPr lang="zh-CN" altLang="en-US" smtClean="0"/>
-              <a:t>2022-02-24</a:t>
+              <a:t>2022-02-25</a:t>
             </a:fld>
             <a:endParaRPr lang="zh-CN" altLang="en-US"/>
           </a:p>
@@ -577,7 +577,7 @@
           <a:p>
             <a:fld id="{D997B5FA-0921-464F-AAE1-844C04324D75}" type="datetimeFigureOut">
               <a:rPr lang="zh-CN" altLang="en-US" smtClean="0"/>
-              <a:t>2022-02-24</a:t>
+              <a:t>2022-02-25</a:t>
             </a:fld>
             <a:endParaRPr lang="zh-CN" altLang="en-US"/>
           </a:p>
@@ -740,7 +740,7 @@
           <a:p>
             <a:fld id="{D997B5FA-0921-464F-AAE1-844C04324D75}" type="datetimeFigureOut">
               <a:rPr lang="zh-CN" altLang="en-US" smtClean="0"/>
-              <a:t>2022-02-24</a:t>
+              <a:t>2022-02-25</a:t>
             </a:fld>
             <a:endParaRPr lang="zh-CN" altLang="en-US"/>
           </a:p>
@@ -980,7 +980,7 @@
           <a:p>
             <a:fld id="{D997B5FA-0921-464F-AAE1-844C04324D75}" type="datetimeFigureOut">
               <a:rPr lang="zh-CN" altLang="en-US" smtClean="0"/>
-              <a:t>2022-02-24</a:t>
+              <a:t>2022-02-25</a:t>
             </a:fld>
             <a:endParaRPr lang="zh-CN" altLang="en-US"/>
           </a:p>
@@ -1204,7 +1204,7 @@
           <a:p>
             <a:fld id="{D997B5FA-0921-464F-AAE1-844C04324D75}" type="datetimeFigureOut">
               <a:rPr lang="zh-CN" altLang="en-US" smtClean="0"/>
-              <a:t>2022-02-24</a:t>
+              <a:t>2022-02-25</a:t>
             </a:fld>
             <a:endParaRPr lang="zh-CN" altLang="en-US"/>
           </a:p>
@@ -1563,7 +1563,7 @@
           <a:p>
             <a:fld id="{D997B5FA-0921-464F-AAE1-844C04324D75}" type="datetimeFigureOut">
               <a:rPr lang="zh-CN" altLang="en-US" smtClean="0"/>
-              <a:t>2022-02-24</a:t>
+              <a:t>2022-02-25</a:t>
             </a:fld>
             <a:endParaRPr lang="zh-CN" altLang="en-US"/>
           </a:p>
@@ -1675,7 +1675,7 @@
           <a:p>
             <a:fld id="{D997B5FA-0921-464F-AAE1-844C04324D75}" type="datetimeFigureOut">
               <a:rPr lang="zh-CN" altLang="en-US" smtClean="0"/>
-              <a:t>2022-02-24</a:t>
+              <a:t>2022-02-25</a:t>
             </a:fld>
             <a:endParaRPr lang="zh-CN" altLang="en-US"/>
           </a:p>
@@ -1765,7 +1765,7 @@
           <a:p>
             <a:fld id="{D997B5FA-0921-464F-AAE1-844C04324D75}" type="datetimeFigureOut">
               <a:rPr lang="zh-CN" altLang="en-US" smtClean="0"/>
-              <a:t>2022-02-24</a:t>
+              <a:t>2022-02-25</a:t>
             </a:fld>
             <a:endParaRPr lang="zh-CN" altLang="en-US"/>
           </a:p>
@@ -2035,7 +2035,7 @@
           <a:p>
             <a:fld id="{D997B5FA-0921-464F-AAE1-844C04324D75}" type="datetimeFigureOut">
               <a:rPr lang="zh-CN" altLang="en-US" smtClean="0"/>
-              <a:t>2022-02-24</a:t>
+              <a:t>2022-02-25</a:t>
             </a:fld>
             <a:endParaRPr lang="zh-CN" altLang="en-US"/>
           </a:p>
@@ -2282,7 +2282,7 @@
           <a:p>
             <a:fld id="{D997B5FA-0921-464F-AAE1-844C04324D75}" type="datetimeFigureOut">
               <a:rPr lang="zh-CN" altLang="en-US" smtClean="0"/>
-              <a:t>2022-02-24</a:t>
+              <a:t>2022-02-25</a:t>
             </a:fld>
             <a:endParaRPr lang="zh-CN" altLang="en-US"/>
           </a:p>
@@ -2488,7 +2488,7 @@
           <a:p>
             <a:fld id="{D997B5FA-0921-464F-AAE1-844C04324D75}" type="datetimeFigureOut">
               <a:rPr lang="zh-CN" altLang="en-US" smtClean="0"/>
-              <a:t>2022-02-24</a:t>
+              <a:t>2022-02-25</a:t>
             </a:fld>
             <a:endParaRPr lang="zh-CN" altLang="en-US"/>
           </a:p>
@@ -7879,7 +7879,7 @@
                     <a:latin typeface="Calibri" panose="020F0502020204030204" pitchFamily="34" charset="0"/>
                     <a:cs typeface="Calibri" panose="020F0502020204030204" pitchFamily="34" charset="0"/>
                   </a:rPr>
-                  <a:t>Byzantine Client</a:t>
+                  <a:t>Byzantine Attacker</a:t>
                 </a:r>
               </a:p>
             </p:txBody>

</xml_diff>